<commit_message>
presentation on deflection, force data, and vids, also Princeton paper
</commit_message>
<xml_diff>
--- a/IDEAlab/Presentations/Jacob Summer Update IV.pptx
+++ b/IDEAlab/Presentations/Jacob Summer Update IV.pptx
@@ -5,16 +5,15 @@
     <p:sldMasterId id="2147483696" r:id="rId1"/>
   </p:sldMasterIdLst>
   <p:notesMasterIdLst>
-    <p:notesMasterId r:id="rId9"/>
+    <p:notesMasterId r:id="rId8"/>
   </p:notesMasterIdLst>
   <p:sldIdLst>
     <p:sldId id="256" r:id="rId2"/>
     <p:sldId id="257" r:id="rId3"/>
     <p:sldId id="261" r:id="rId4"/>
-    <p:sldId id="258" r:id="rId5"/>
-    <p:sldId id="262" r:id="rId6"/>
-    <p:sldId id="263" r:id="rId7"/>
-    <p:sldId id="264" r:id="rId8"/>
+    <p:sldId id="262" r:id="rId5"/>
+    <p:sldId id="263" r:id="rId6"/>
+    <p:sldId id="264" r:id="rId7"/>
   </p:sldIdLst>
   <p:sldSz cx="12192000" cy="6858000"/>
   <p:notesSz cx="6858000" cy="9144000"/>
@@ -121,6 +120,10 @@
 </p:presentation>
 </file>
 
+<file path=ppt/revisionInfo.xml><?xml version="1.0" encoding="utf-8"?>
+<p1510:revInfo xmlns:a="http://schemas.openxmlformats.org/drawingml/2006/main" xmlns:r="http://schemas.openxmlformats.org/officeDocument/2006/relationships" xmlns:p1510="http://schemas.microsoft.com/office/powerpoint/2015/10/main"/>
+</file>
+
 <file path=ppt/notesMasters/notesMaster1.xml><?xml version="1.0" encoding="utf-8"?>
 <p:notesMaster xmlns:a="http://schemas.openxmlformats.org/drawingml/2006/main" xmlns:r="http://schemas.openxmlformats.org/officeDocument/2006/relationships" xmlns:p="http://schemas.openxmlformats.org/presentationml/2006/main">
   <p:cSld>
@@ -203,7 +206,7 @@
           <a:p>
             <a:fld id="{2ED7F260-2CD9-45F9-AE57-C10EE5666276}" type="datetimeFigureOut">
               <a:rPr lang="en-US" smtClean="0"/>
-              <a:t>8/4/2017</a:t>
+              <a:t>9/15/2017</a:t>
             </a:fld>
             <a:endParaRPr lang="en-US"/>
           </a:p>
@@ -535,7 +538,7 @@
           <a:p>
             <a:fld id="{21537662-F932-430F-9D57-23E5A20C5EBD}" type="slidenum">
               <a:rPr lang="en-US" smtClean="0"/>
-              <a:t>5</a:t>
+              <a:t>4</a:t>
             </a:fld>
             <a:endParaRPr lang="en-US"/>
           </a:p>
@@ -685,7 +688,7 @@
           <a:p>
             <a:fld id="{CFC36377-5E45-413A-82FF-B7E6E5303FD2}" type="datetimeFigureOut">
               <a:rPr lang="en-US" smtClean="0"/>
-              <a:t>8/4/2017</a:t>
+              <a:t>9/15/2017</a:t>
             </a:fld>
             <a:endParaRPr lang="en-US"/>
           </a:p>
@@ -860,7 +863,7 @@
           <a:p>
             <a:fld id="{CFC36377-5E45-413A-82FF-B7E6E5303FD2}" type="datetimeFigureOut">
               <a:rPr lang="en-US" smtClean="0"/>
-              <a:t>8/4/2017</a:t>
+              <a:t>9/15/2017</a:t>
             </a:fld>
             <a:endParaRPr lang="en-US"/>
           </a:p>
@@ -1040,7 +1043,7 @@
           <a:p>
             <a:fld id="{CFC36377-5E45-413A-82FF-B7E6E5303FD2}" type="datetimeFigureOut">
               <a:rPr lang="en-US" smtClean="0"/>
-              <a:t>8/4/2017</a:t>
+              <a:t>9/15/2017</a:t>
             </a:fld>
             <a:endParaRPr lang="en-US"/>
           </a:p>
@@ -1215,7 +1218,7 @@
           <a:p>
             <a:fld id="{CFC36377-5E45-413A-82FF-B7E6E5303FD2}" type="datetimeFigureOut">
               <a:rPr lang="en-US" smtClean="0"/>
-              <a:t>8/4/2017</a:t>
+              <a:t>9/15/2017</a:t>
             </a:fld>
             <a:endParaRPr lang="en-US"/>
           </a:p>
@@ -1461,7 +1464,7 @@
           <a:p>
             <a:fld id="{CFC36377-5E45-413A-82FF-B7E6E5303FD2}" type="datetimeFigureOut">
               <a:rPr lang="en-US" smtClean="0"/>
-              <a:t>8/4/2017</a:t>
+              <a:t>9/15/2017</a:t>
             </a:fld>
             <a:endParaRPr lang="en-US"/>
           </a:p>
@@ -1698,7 +1701,7 @@
           <a:p>
             <a:fld id="{CFC36377-5E45-413A-82FF-B7E6E5303FD2}" type="datetimeFigureOut">
               <a:rPr lang="en-US" smtClean="0"/>
-              <a:t>8/4/2017</a:t>
+              <a:t>9/15/2017</a:t>
             </a:fld>
             <a:endParaRPr lang="en-US"/>
           </a:p>
@@ -2065,7 +2068,7 @@
           <a:p>
             <a:fld id="{CFC36377-5E45-413A-82FF-B7E6E5303FD2}" type="datetimeFigureOut">
               <a:rPr lang="en-US" smtClean="0"/>
-              <a:t>8/4/2017</a:t>
+              <a:t>9/15/2017</a:t>
             </a:fld>
             <a:endParaRPr lang="en-US"/>
           </a:p>
@@ -2183,7 +2186,7 @@
           <a:p>
             <a:fld id="{CFC36377-5E45-413A-82FF-B7E6E5303FD2}" type="datetimeFigureOut">
               <a:rPr lang="en-US" smtClean="0"/>
-              <a:t>8/4/2017</a:t>
+              <a:t>9/15/2017</a:t>
             </a:fld>
             <a:endParaRPr lang="en-US"/>
           </a:p>
@@ -2278,7 +2281,7 @@
           <a:p>
             <a:fld id="{CFC36377-5E45-413A-82FF-B7E6E5303FD2}" type="datetimeFigureOut">
               <a:rPr lang="en-US" smtClean="0"/>
-              <a:t>8/4/2017</a:t>
+              <a:t>9/15/2017</a:t>
             </a:fld>
             <a:endParaRPr lang="en-US"/>
           </a:p>
@@ -2555,7 +2558,7 @@
           <a:p>
             <a:fld id="{CFC36377-5E45-413A-82FF-B7E6E5303FD2}" type="datetimeFigureOut">
               <a:rPr lang="en-US" smtClean="0"/>
-              <a:t>8/4/2017</a:t>
+              <a:t>9/15/2017</a:t>
             </a:fld>
             <a:endParaRPr lang="en-US"/>
           </a:p>
@@ -2812,7 +2815,7 @@
           <a:p>
             <a:fld id="{CFC36377-5E45-413A-82FF-B7E6E5303FD2}" type="datetimeFigureOut">
               <a:rPr lang="en-US" smtClean="0"/>
-              <a:t>8/4/2017</a:t>
+              <a:t>9/15/2017</a:t>
             </a:fld>
             <a:endParaRPr lang="en-US"/>
           </a:p>
@@ -3025,7 +3028,7 @@
           <a:p>
             <a:fld id="{CFC36377-5E45-413A-82FF-B7E6E5303FD2}" type="datetimeFigureOut">
               <a:rPr lang="en-US" smtClean="0"/>
-              <a:t>8/4/2017</a:t>
+              <a:t>9/15/2017</a:t>
             </a:fld>
             <a:endParaRPr lang="en-US"/>
           </a:p>
@@ -3467,7 +3470,12 @@
             <p:ph type="subTitle" idx="1"/>
           </p:nvPr>
         </p:nvSpPr>
-        <p:spPr/>
+        <p:spPr>
+          <a:xfrm>
+            <a:off x="1524000" y="3602038"/>
+            <a:ext cx="9144000" cy="1655762"/>
+          </a:xfrm>
+        </p:spPr>
         <p:txBody>
           <a:bodyPr>
             <a:normAutofit/>
@@ -3476,7 +3484,7 @@
           <a:p>
             <a:r>
               <a:rPr lang="en-US" sz="3600" dirty="0"/>
-              <a:t>Optimization</a:t>
+              <a:t>Experimental Setup</a:t>
             </a:r>
           </a:p>
         </p:txBody>
@@ -3528,7 +3536,7 @@
           <a:p>
             <a:r>
               <a:rPr lang="en-US" dirty="0"/>
-              <a:t>Overview</a:t>
+              <a:t>Where we’re at</a:t>
             </a:r>
           </a:p>
         </p:txBody>
@@ -3553,26 +3561,40 @@
             </a:pPr>
             <a:r>
               <a:rPr lang="en-US" sz="3200" i="1" dirty="0"/>
-              <a:t>To build a dynamic robot capable of balancing and hopping</a:t>
-            </a:r>
-          </a:p>
-          <a:p>
-            <a:r>
-              <a:rPr lang="en-US" dirty="0"/>
-              <a:t>Incorporate force measurement device</a:t>
-            </a:r>
-          </a:p>
-          <a:p>
-            <a:r>
-              <a:rPr lang="en-US" dirty="0"/>
-              <a:t>Begin with hopping 2dof leg</a:t>
-            </a:r>
-          </a:p>
-          <a:p>
-            <a:r>
-              <a:rPr lang="en-US" dirty="0"/>
-              <a:t>Use simulation to inform design</a:t>
-            </a:r>
+              <a:t>Validate/improve simulation with experiments</a:t>
+            </a:r>
+          </a:p>
+          <a:p>
+            <a:r>
+              <a:rPr lang="en-US" sz="3200" dirty="0"/>
+              <a:t>Design experimental setup to capture:</a:t>
+            </a:r>
+          </a:p>
+          <a:p>
+            <a:pPr lvl="1"/>
+            <a:r>
+              <a:rPr lang="en-US" sz="2800" dirty="0"/>
+              <a:t>Forces (load cell)</a:t>
+            </a:r>
+          </a:p>
+          <a:p>
+            <a:pPr lvl="1"/>
+            <a:r>
+              <a:rPr lang="en-US" sz="2800" dirty="0"/>
+              <a:t>Jump height (cameras)</a:t>
+            </a:r>
+          </a:p>
+          <a:p>
+            <a:pPr lvl="1"/>
+            <a:r>
+              <a:rPr lang="en-US" sz="2800" dirty="0"/>
+              <a:t>Power consumption (V/</a:t>
+            </a:r>
+            <a:r>
+              <a:rPr lang="en-US" sz="2800"/>
+              <a:t>I sensor)</a:t>
+            </a:r>
+            <a:endParaRPr lang="en-US" sz="2800" dirty="0"/>
           </a:p>
         </p:txBody>
       </p:sp>
@@ -3706,287 +3728,6 @@
           <a:p>
             <a:r>
               <a:rPr lang="en-US" dirty="0"/>
-              <a:t>Tasks</a:t>
-            </a:r>
-          </a:p>
-        </p:txBody>
-      </p:sp>
-      <p:sp>
-        <p:nvSpPr>
-          <p:cNvPr id="3" name="Content Placeholder 2"/>
-          <p:cNvSpPr>
-            <a:spLocks noGrp="1"/>
-          </p:cNvSpPr>
-          <p:nvPr>
-            <p:ph idx="1"/>
-          </p:nvPr>
-        </p:nvSpPr>
-        <p:spPr>
-          <a:xfrm>
-            <a:off x="838200" y="1825625"/>
-            <a:ext cx="10515600" cy="4351338"/>
-          </a:xfrm>
-        </p:spPr>
-        <p:txBody>
-          <a:bodyPr>
-            <a:normAutofit fontScale="55000" lnSpcReduction="20000"/>
-          </a:bodyPr>
-          <a:lstStyle/>
-          <a:p>
-            <a:pPr marL="514350" lvl="0" indent="-514350">
-              <a:buFont typeface="+mj-lt"/>
-              <a:buAutoNum type="arabicPeriod"/>
-            </a:pPr>
-            <a:r>
-              <a:rPr lang="en-US" dirty="0"/>
-              <a:t>Use Unity to:</a:t>
-            </a:r>
-          </a:p>
-          <a:p>
-            <a:pPr marL="971550" lvl="1" indent="-514350">
-              <a:buFont typeface="+mj-lt"/>
-              <a:buAutoNum type="alphaUcPeriod"/>
-            </a:pPr>
-            <a:r>
-              <a:rPr lang="en-US" dirty="0"/>
-              <a:t>Model spring, joints, and contact</a:t>
-            </a:r>
-          </a:p>
-          <a:p>
-            <a:pPr marL="971550" lvl="1" indent="-514350">
-              <a:buFont typeface="+mj-lt"/>
-              <a:buAutoNum type="alphaUcPeriod"/>
-            </a:pPr>
-            <a:r>
-              <a:rPr lang="en-US" dirty="0"/>
-              <a:t>Collect data</a:t>
-            </a:r>
-          </a:p>
-          <a:p>
-            <a:pPr marL="971550" lvl="1" indent="-514350">
-              <a:buFont typeface="+mj-lt"/>
-              <a:buAutoNum type="alphaUcPeriod"/>
-            </a:pPr>
-            <a:r>
-              <a:rPr lang="en-US" dirty="0"/>
-              <a:t>Respond to feedback and actuate mechanism</a:t>
-            </a:r>
-          </a:p>
-          <a:p>
-            <a:pPr marL="971550" lvl="1" indent="-514350">
-              <a:buFont typeface="+mj-lt"/>
-              <a:buAutoNum type="alphaUcPeriod"/>
-            </a:pPr>
-            <a:r>
-              <a:rPr lang="en-US" dirty="0"/>
-              <a:t>Enable interaction</a:t>
-            </a:r>
-          </a:p>
-          <a:p>
-            <a:pPr marL="514350" lvl="0" indent="-514350">
-              <a:buFont typeface="+mj-lt"/>
-              <a:buAutoNum type="arabicPeriod"/>
-            </a:pPr>
-            <a:r>
-              <a:rPr lang="en-US" dirty="0"/>
-              <a:t>Build simulation of leg</a:t>
-            </a:r>
-            <a:endParaRPr lang="en-US" sz="2400" dirty="0"/>
-          </a:p>
-          <a:p>
-            <a:pPr marL="514350" lvl="0" indent="-514350">
-              <a:buFont typeface="+mj-lt"/>
-              <a:buAutoNum type="arabicPeriod"/>
-            </a:pPr>
-            <a:r>
-              <a:rPr lang="en-US" dirty="0"/>
-              <a:t>Use simulation to:</a:t>
-            </a:r>
-            <a:endParaRPr lang="en-US" sz="2400" dirty="0"/>
-          </a:p>
-          <a:p>
-            <a:pPr marL="914400" lvl="1" indent="-457200">
-              <a:buFont typeface="+mj-lt"/>
-              <a:buAutoNum type="alphaUcPeriod"/>
-            </a:pPr>
-            <a:r>
-              <a:rPr lang="en-US" dirty="0"/>
-              <a:t>Select leg dimensions </a:t>
-            </a:r>
-            <a:endParaRPr lang="en-US" sz="2000" dirty="0"/>
-          </a:p>
-          <a:p>
-            <a:pPr marL="914400" lvl="1" indent="-457200">
-              <a:buFont typeface="+mj-lt"/>
-              <a:buAutoNum type="alphaUcPeriod"/>
-            </a:pPr>
-            <a:r>
-              <a:rPr lang="en-US" dirty="0"/>
-              <a:t>Determine spring characteristics</a:t>
-            </a:r>
-            <a:endParaRPr lang="en-US" sz="2000" dirty="0"/>
-          </a:p>
-          <a:p>
-            <a:pPr marL="914400" lvl="1" indent="-457200">
-              <a:buFont typeface="+mj-lt"/>
-              <a:buAutoNum type="alphaUcPeriod"/>
-            </a:pPr>
-            <a:r>
-              <a:rPr lang="en-US" dirty="0"/>
-              <a:t>Select motors</a:t>
-            </a:r>
-            <a:endParaRPr lang="en-US" sz="2000" dirty="0"/>
-          </a:p>
-          <a:p>
-            <a:pPr marL="514350" lvl="0" indent="-514350">
-              <a:buFont typeface="+mj-lt"/>
-              <a:buAutoNum type="arabicPeriod"/>
-            </a:pPr>
-            <a:r>
-              <a:rPr lang="en-US" dirty="0"/>
-              <a:t>Manufacture first prototype</a:t>
-            </a:r>
-            <a:endParaRPr lang="en-US" sz="2400" dirty="0"/>
-          </a:p>
-          <a:p>
-            <a:pPr marL="514350" lvl="0" indent="-514350">
-              <a:buFont typeface="+mj-lt"/>
-              <a:buAutoNum type="arabicPeriod"/>
-            </a:pPr>
-            <a:r>
-              <a:rPr lang="en-US" dirty="0"/>
-              <a:t>Design harness</a:t>
-            </a:r>
-            <a:endParaRPr lang="en-US" sz="2400" dirty="0"/>
-          </a:p>
-          <a:p>
-            <a:pPr marL="514350" lvl="0" indent="-514350">
-              <a:buFont typeface="+mj-lt"/>
-              <a:buAutoNum type="arabicPeriod"/>
-            </a:pPr>
-            <a:r>
-              <a:rPr lang="en-US" dirty="0"/>
-              <a:t>Manufacture harness</a:t>
-            </a:r>
-            <a:endParaRPr lang="en-US" sz="2400" dirty="0"/>
-          </a:p>
-          <a:p>
-            <a:pPr marL="514350" lvl="0" indent="-514350">
-              <a:buFont typeface="+mj-lt"/>
-              <a:buAutoNum type="arabicPeriod"/>
-            </a:pPr>
-            <a:r>
-              <a:rPr lang="en-US" dirty="0"/>
-              <a:t>Write vertical hopping code</a:t>
-            </a:r>
-            <a:endParaRPr lang="en-US" sz="2400" dirty="0"/>
-          </a:p>
-          <a:p>
-            <a:pPr marL="514350" lvl="0" indent="-514350">
-              <a:buFont typeface="+mj-lt"/>
-              <a:buAutoNum type="arabicPeriod"/>
-            </a:pPr>
-            <a:r>
-              <a:rPr lang="en-US" dirty="0"/>
-              <a:t>Test code in simulation</a:t>
-            </a:r>
-            <a:endParaRPr lang="en-US" sz="2400" dirty="0"/>
-          </a:p>
-          <a:p>
-            <a:pPr marL="514350" lvl="0" indent="-514350">
-              <a:buFont typeface="+mj-lt"/>
-              <a:buAutoNum type="arabicPeriod"/>
-            </a:pPr>
-            <a:r>
-              <a:rPr lang="en-US" dirty="0"/>
-              <a:t>Test hopping with actual leg</a:t>
-            </a:r>
-            <a:endParaRPr lang="en-US" sz="2400" dirty="0"/>
-          </a:p>
-        </p:txBody>
-      </p:sp>
-      <p:cxnSp>
-        <p:nvCxnSpPr>
-          <p:cNvPr id="5" name="Straight Connector 4"/>
-          <p:cNvCxnSpPr/>
-          <p:nvPr/>
-        </p:nvCxnSpPr>
-        <p:spPr>
-          <a:xfrm>
-            <a:off x="651769" y="3822774"/>
-            <a:ext cx="10515600" cy="0"/>
-          </a:xfrm>
-          <a:prstGeom prst="line">
-            <a:avLst/>
-          </a:prstGeom>
-          <a:ln>
-            <a:solidFill>
-              <a:schemeClr val="tx1"/>
-            </a:solidFill>
-          </a:ln>
-        </p:spPr>
-        <p:style>
-          <a:lnRef idx="1">
-            <a:schemeClr val="accent1"/>
-          </a:lnRef>
-          <a:fillRef idx="0">
-            <a:schemeClr val="accent1"/>
-          </a:fillRef>
-          <a:effectRef idx="0">
-            <a:schemeClr val="accent1"/>
-          </a:effectRef>
-          <a:fontRef idx="minor">
-            <a:schemeClr val="tx1"/>
-          </a:fontRef>
-        </p:style>
-      </p:cxnSp>
-    </p:spTree>
-    <p:extLst>
-      <p:ext uri="{BB962C8B-B14F-4D97-AF65-F5344CB8AC3E}">
-        <p14:creationId xmlns:p14="http://schemas.microsoft.com/office/powerpoint/2010/main" val="147139820"/>
-      </p:ext>
-    </p:extLst>
-  </p:cSld>
-  <p:clrMapOvr>
-    <a:masterClrMapping/>
-  </p:clrMapOvr>
-</p:sld>
-</file>
-
-<file path=ppt/slides/slide5.xml><?xml version="1.0" encoding="utf-8"?>
-<p:sld xmlns:a="http://schemas.openxmlformats.org/drawingml/2006/main" xmlns:r="http://schemas.openxmlformats.org/officeDocument/2006/relationships" xmlns:p="http://schemas.openxmlformats.org/presentationml/2006/main">
-  <p:cSld>
-    <p:spTree>
-      <p:nvGrpSpPr>
-        <p:cNvPr id="1" name=""/>
-        <p:cNvGrpSpPr/>
-        <p:nvPr/>
-      </p:nvGrpSpPr>
-      <p:grpSpPr>
-        <a:xfrm>
-          <a:off x="0" y="0"/>
-          <a:ext cx="0" cy="0"/>
-          <a:chOff x="0" y="0"/>
-          <a:chExt cx="0" cy="0"/>
-        </a:xfrm>
-      </p:grpSpPr>
-      <p:sp>
-        <p:nvSpPr>
-          <p:cNvPr id="2" name="Title 1"/>
-          <p:cNvSpPr>
-            <a:spLocks noGrp="1"/>
-          </p:cNvSpPr>
-          <p:nvPr>
-            <p:ph type="title"/>
-          </p:nvPr>
-        </p:nvSpPr>
-        <p:spPr/>
-        <p:txBody>
-          <a:bodyPr/>
-          <a:lstStyle/>
-          <a:p>
-            <a:r>
-              <a:rPr lang="en-US" dirty="0"/>
               <a:t>Simulation MATLAB</a:t>
             </a:r>
           </a:p>
@@ -4081,7 +3822,7 @@
 </p:sld>
 </file>
 
-<file path=ppt/slides/slide6.xml><?xml version="1.0" encoding="utf-8"?>
+<file path=ppt/slides/slide5.xml><?xml version="1.0" encoding="utf-8"?>
 <p:sld xmlns:a="http://schemas.openxmlformats.org/drawingml/2006/main" xmlns:r="http://schemas.openxmlformats.org/officeDocument/2006/relationships" xmlns:p="http://schemas.openxmlformats.org/presentationml/2006/main">
   <p:cSld>
     <p:spTree>
@@ -4224,7 +3965,7 @@
 </p:sld>
 </file>
 
-<file path=ppt/slides/slide7.xml><?xml version="1.0" encoding="utf-8"?>
+<file path=ppt/slides/slide6.xml><?xml version="1.0" encoding="utf-8"?>
 <p:sld xmlns:a="http://schemas.openxmlformats.org/drawingml/2006/main" xmlns:r="http://schemas.openxmlformats.org/officeDocument/2006/relationships" xmlns:p="http://schemas.openxmlformats.org/presentationml/2006/main">
   <p:cSld>
     <p:spTree>

</xml_diff>